<commit_message>
Materiais para aula 2.
</commit_message>
<xml_diff>
--- a/Aula02.pptx
+++ b/Aula02.pptx
@@ -303,7 +303,7 @@
           <a:p>
             <a:fld id="{2E700DB3-DBF0-4086-B675-117E7A9610B8}" type="datetimeFigureOut">
               <a:rPr lang="pt-BR" smtClean="0"/>
-              <a:t>09/11/2017</a:t>
+              <a:t>10/11/2017</a:t>
             </a:fld>
             <a:endParaRPr lang="pt-BR"/>
           </a:p>
@@ -468,7 +468,7 @@
           <a:p>
             <a:fld id="{2E700DB3-DBF0-4086-B675-117E7A9610B8}" type="datetimeFigureOut">
               <a:rPr lang="pt-BR" smtClean="0"/>
-              <a:t>09/11/2017</a:t>
+              <a:t>10/11/2017</a:t>
             </a:fld>
             <a:endParaRPr lang="pt-BR"/>
           </a:p>
@@ -643,7 +643,7 @@
           <a:p>
             <a:fld id="{2E700DB3-DBF0-4086-B675-117E7A9610B8}" type="datetimeFigureOut">
               <a:rPr lang="pt-BR" smtClean="0"/>
-              <a:t>09/11/2017</a:t>
+              <a:t>10/11/2017</a:t>
             </a:fld>
             <a:endParaRPr lang="pt-BR"/>
           </a:p>
@@ -808,7 +808,7 @@
           <a:p>
             <a:fld id="{2E700DB3-DBF0-4086-B675-117E7A9610B8}" type="datetimeFigureOut">
               <a:rPr lang="pt-BR" smtClean="0"/>
-              <a:t>09/11/2017</a:t>
+              <a:t>10/11/2017</a:t>
             </a:fld>
             <a:endParaRPr lang="pt-BR"/>
           </a:p>
@@ -1050,7 +1050,7 @@
           <a:p>
             <a:fld id="{2E700DB3-DBF0-4086-B675-117E7A9610B8}" type="datetimeFigureOut">
               <a:rPr lang="pt-BR" smtClean="0"/>
-              <a:t>09/11/2017</a:t>
+              <a:t>10/11/2017</a:t>
             </a:fld>
             <a:endParaRPr lang="pt-BR"/>
           </a:p>
@@ -1314,7 +1314,7 @@
           <a:p>
             <a:fld id="{2E700DB3-DBF0-4086-B675-117E7A9610B8}" type="datetimeFigureOut">
               <a:rPr lang="pt-BR" smtClean="0"/>
-              <a:t>09/11/2017</a:t>
+              <a:t>10/11/2017</a:t>
             </a:fld>
             <a:endParaRPr lang="pt-BR"/>
           </a:p>
@@ -1692,7 +1692,7 @@
           <a:p>
             <a:fld id="{2E700DB3-DBF0-4086-B675-117E7A9610B8}" type="datetimeFigureOut">
               <a:rPr lang="pt-BR" smtClean="0"/>
-              <a:t>09/11/2017</a:t>
+              <a:t>10/11/2017</a:t>
             </a:fld>
             <a:endParaRPr lang="pt-BR"/>
           </a:p>
@@ -1842,7 +1842,7 @@
           <a:p>
             <a:fld id="{2E700DB3-DBF0-4086-B675-117E7A9610B8}" type="datetimeFigureOut">
               <a:rPr lang="pt-BR" smtClean="0"/>
-              <a:t>09/11/2017</a:t>
+              <a:t>10/11/2017</a:t>
             </a:fld>
             <a:endParaRPr lang="pt-BR"/>
           </a:p>
@@ -1932,7 +1932,7 @@
           <a:p>
             <a:fld id="{2E700DB3-DBF0-4086-B675-117E7A9610B8}" type="datetimeFigureOut">
               <a:rPr lang="pt-BR" smtClean="0"/>
-              <a:t>09/11/2017</a:t>
+              <a:t>10/11/2017</a:t>
             </a:fld>
             <a:endParaRPr lang="pt-BR"/>
           </a:p>
@@ -2193,7 +2193,7 @@
           <a:p>
             <a:fld id="{2E700DB3-DBF0-4086-B675-117E7A9610B8}" type="datetimeFigureOut">
               <a:rPr lang="pt-BR" smtClean="0"/>
-              <a:t>09/11/2017</a:t>
+              <a:t>10/11/2017</a:t>
             </a:fld>
             <a:endParaRPr lang="pt-BR"/>
           </a:p>
@@ -2481,7 +2481,7 @@
           <a:p>
             <a:fld id="{2E700DB3-DBF0-4086-B675-117E7A9610B8}" type="datetimeFigureOut">
               <a:rPr lang="pt-BR" smtClean="0"/>
-              <a:t>09/11/2017</a:t>
+              <a:t>10/11/2017</a:t>
             </a:fld>
             <a:endParaRPr lang="pt-BR"/>
           </a:p>
@@ -3252,7 +3252,7 @@
           <a:p>
             <a:fld id="{2E700DB3-DBF0-4086-B675-117E7A9610B8}" type="datetimeFigureOut">
               <a:rPr lang="pt-BR" smtClean="0"/>
-              <a:t>09/11/2017</a:t>
+              <a:t>10/11/2017</a:t>
             </a:fld>
             <a:endParaRPr lang="pt-BR"/>
           </a:p>
@@ -3887,7 +3887,11 @@
           <a:p>
             <a:r>
               <a:rPr lang="pt-BR" dirty="0" smtClean="0"/>
-              <a:t>Banco de Dados</a:t>
+              <a:t>Banco de </a:t>
+            </a:r>
+            <a:r>
+              <a:rPr lang="pt-BR" smtClean="0"/>
+              <a:t>Dados – Aula 02</a:t>
             </a:r>
             <a:endParaRPr lang="pt-BR" dirty="0"/>
           </a:p>
@@ -6175,7 +6179,15 @@
           <a:p>
             <a:r>
               <a:rPr lang="pt-BR" dirty="0" smtClean="0"/>
-              <a:t>Diagrama de Projeto (Tabelas)</a:t>
+              <a:t>Diagrama de </a:t>
+            </a:r>
+            <a:r>
+              <a:rPr lang="pt-BR" dirty="0" smtClean="0"/>
+              <a:t>Projeto (Tabelas</a:t>
+            </a:r>
+            <a:r>
+              <a:rPr lang="pt-BR" dirty="0" smtClean="0"/>
+              <a:t>)</a:t>
             </a:r>
             <a:endParaRPr lang="pt-BR" dirty="0"/>
           </a:p>
@@ -6251,7 +6263,7 @@
 </file>
 
 <file path=ppt/slides/slide21.xml><?xml version="1.0" encoding="utf-8"?>
-<p:sld xmlns:a="http://schemas.openxmlformats.org/drawingml/2006/main" xmlns:r="http://schemas.openxmlformats.org/officeDocument/2006/relationships" xmlns:p="http://schemas.openxmlformats.org/presentationml/2006/main">
+<p:sld xmlns:a="http://schemas.openxmlformats.org/drawingml/2006/main" xmlns:r="http://schemas.openxmlformats.org/officeDocument/2006/relationships" xmlns:p="http://schemas.openxmlformats.org/presentationml/2006/main" show="0">
   <p:cSld>
     <p:spTree>
       <p:nvGrpSpPr>
@@ -6358,6 +6370,14 @@
   <p:clrMapOvr>
     <a:masterClrMapping/>
   </p:clrMapOvr>
+  <mc:AlternateContent xmlns:mc="http://schemas.openxmlformats.org/markup-compatibility/2006">
+    <mc:Choice xmlns:p14="http://schemas.microsoft.com/office/powerpoint/2010/main" Requires="p14">
+      <p:transition spd="slow" p14:dur="2000"/>
+    </mc:Choice>
+    <mc:Fallback>
+      <p:transition spd="slow"/>
+    </mc:Fallback>
+  </mc:AlternateContent>
 </p:sld>
 </file>
 

</xml_diff>